<commit_message>
updataed main page only
</commit_message>
<xml_diff>
--- a/callum is not asian.pptx
+++ b/callum is not asian.pptx
@@ -104,6 +104,11 @@
       </a:defRPr>
     </a:lvl9pPr>
   </p:defaultTextStyle>
+  <p:extLst>
+    <p:ext uri="{EFAFB233-063F-42B5-8137-9DF3F51BA10A}">
+      <p15:sldGuideLst xmlns:p15="http://schemas.microsoft.com/office/powerpoint/2012/main"/>
+    </p:ext>
+  </p:extLst>
 </p:presentation>
 </file>
 
@@ -238,7 +243,7 @@
           <a:p>
             <a:fld id="{745EABE3-D84A-44C6-BC81-58FB2CDECEDF}" type="datetimeFigureOut">
               <a:rPr lang="en-AU" smtClean="0"/>
-              <a:t>21/11/2017</a:t>
+              <a:t>22/11/2017</a:t>
             </a:fld>
             <a:endParaRPr lang="en-AU"/>
           </a:p>
@@ -408,7 +413,7 @@
           <a:p>
             <a:fld id="{745EABE3-D84A-44C6-BC81-58FB2CDECEDF}" type="datetimeFigureOut">
               <a:rPr lang="en-AU" smtClean="0"/>
-              <a:t>21/11/2017</a:t>
+              <a:t>22/11/2017</a:t>
             </a:fld>
             <a:endParaRPr lang="en-AU"/>
           </a:p>
@@ -588,7 +593,7 @@
           <a:p>
             <a:fld id="{745EABE3-D84A-44C6-BC81-58FB2CDECEDF}" type="datetimeFigureOut">
               <a:rPr lang="en-AU" smtClean="0"/>
-              <a:t>21/11/2017</a:t>
+              <a:t>22/11/2017</a:t>
             </a:fld>
             <a:endParaRPr lang="en-AU"/>
           </a:p>
@@ -758,7 +763,7 @@
           <a:p>
             <a:fld id="{745EABE3-D84A-44C6-BC81-58FB2CDECEDF}" type="datetimeFigureOut">
               <a:rPr lang="en-AU" smtClean="0"/>
-              <a:t>21/11/2017</a:t>
+              <a:t>22/11/2017</a:t>
             </a:fld>
             <a:endParaRPr lang="en-AU"/>
           </a:p>
@@ -1004,7 +1009,7 @@
           <a:p>
             <a:fld id="{745EABE3-D84A-44C6-BC81-58FB2CDECEDF}" type="datetimeFigureOut">
               <a:rPr lang="en-AU" smtClean="0"/>
-              <a:t>21/11/2017</a:t>
+              <a:t>22/11/2017</a:t>
             </a:fld>
             <a:endParaRPr lang="en-AU"/>
           </a:p>
@@ -1236,7 +1241,7 @@
           <a:p>
             <a:fld id="{745EABE3-D84A-44C6-BC81-58FB2CDECEDF}" type="datetimeFigureOut">
               <a:rPr lang="en-AU" smtClean="0"/>
-              <a:t>21/11/2017</a:t>
+              <a:t>22/11/2017</a:t>
             </a:fld>
             <a:endParaRPr lang="en-AU"/>
           </a:p>
@@ -1603,7 +1608,7 @@
           <a:p>
             <a:fld id="{745EABE3-D84A-44C6-BC81-58FB2CDECEDF}" type="datetimeFigureOut">
               <a:rPr lang="en-AU" smtClean="0"/>
-              <a:t>21/11/2017</a:t>
+              <a:t>22/11/2017</a:t>
             </a:fld>
             <a:endParaRPr lang="en-AU"/>
           </a:p>
@@ -1721,7 +1726,7 @@
           <a:p>
             <a:fld id="{745EABE3-D84A-44C6-BC81-58FB2CDECEDF}" type="datetimeFigureOut">
               <a:rPr lang="en-AU" smtClean="0"/>
-              <a:t>21/11/2017</a:t>
+              <a:t>22/11/2017</a:t>
             </a:fld>
             <a:endParaRPr lang="en-AU"/>
           </a:p>
@@ -1816,7 +1821,7 @@
           <a:p>
             <a:fld id="{745EABE3-D84A-44C6-BC81-58FB2CDECEDF}" type="datetimeFigureOut">
               <a:rPr lang="en-AU" smtClean="0"/>
-              <a:t>21/11/2017</a:t>
+              <a:t>22/11/2017</a:t>
             </a:fld>
             <a:endParaRPr lang="en-AU"/>
           </a:p>
@@ -2093,7 +2098,7 @@
           <a:p>
             <a:fld id="{745EABE3-D84A-44C6-BC81-58FB2CDECEDF}" type="datetimeFigureOut">
               <a:rPr lang="en-AU" smtClean="0"/>
-              <a:t>21/11/2017</a:t>
+              <a:t>22/11/2017</a:t>
             </a:fld>
             <a:endParaRPr lang="en-AU"/>
           </a:p>
@@ -2346,7 +2351,7 @@
           <a:p>
             <a:fld id="{745EABE3-D84A-44C6-BC81-58FB2CDECEDF}" type="datetimeFigureOut">
               <a:rPr lang="en-AU" smtClean="0"/>
-              <a:t>21/11/2017</a:t>
+              <a:t>22/11/2017</a:t>
             </a:fld>
             <a:endParaRPr lang="en-AU"/>
           </a:p>
@@ -2559,7 +2564,7 @@
           <a:p>
             <a:fld id="{745EABE3-D84A-44C6-BC81-58FB2CDECEDF}" type="datetimeFigureOut">
               <a:rPr lang="en-AU" smtClean="0"/>
-              <a:t>21/11/2017</a:t>
+              <a:t>22/11/2017</a:t>
             </a:fld>
             <a:endParaRPr lang="en-AU"/>
           </a:p>
@@ -2964,6 +2969,36 @@
           <a:chExt cx="0" cy="0"/>
         </a:xfrm>
       </p:grpSpPr>
+      <p:pic>
+        <p:nvPicPr>
+          <p:cNvPr id="4" name="Picture 3"/>
+          <p:cNvPicPr>
+            <a:picLocks noChangeAspect="1"/>
+          </p:cNvPicPr>
+          <p:nvPr/>
+        </p:nvPicPr>
+        <p:blipFill>
+          <a:blip r:embed="rId2">
+            <a:extLst>
+              <a:ext uri="{28A0092B-C50C-407E-A947-70E740481C1C}">
+                <a14:useLocalDpi xmlns:a14="http://schemas.microsoft.com/office/drawing/2010/main" val="0"/>
+              </a:ext>
+            </a:extLst>
+          </a:blip>
+          <a:stretch>
+            <a:fillRect/>
+          </a:stretch>
+        </p:blipFill>
+        <p:spPr>
+          <a:xfrm>
+            <a:off x="-348343" y="0"/>
+            <a:ext cx="13104459" cy="6858000"/>
+          </a:xfrm>
+          <a:prstGeom prst="rect">
+            <a:avLst/>
+          </a:prstGeom>
+        </p:spPr>
+      </p:pic>
       <p:sp>
         <p:nvSpPr>
           <p:cNvPr id="2" name="Title 1"/>
@@ -2979,7 +3014,19 @@
           <a:bodyPr/>
           <a:lstStyle/>
           <a:p>
-            <a:endParaRPr lang="en-AU"/>
+            <a:r>
+              <a:rPr lang="en-AU" b="1" dirty="0" smtClean="0">
+                <a:solidFill>
+                  <a:srgbClr val="FF6600"/>
+                </a:solidFill>
+              </a:rPr>
+              <a:t>KEY FEATURES AND CULTURE</a:t>
+            </a:r>
+            <a:endParaRPr lang="en-AU" b="1" dirty="0">
+              <a:solidFill>
+                <a:srgbClr val="FF6600"/>
+              </a:solidFill>
+            </a:endParaRPr>
           </a:p>
         </p:txBody>
       </p:sp>
@@ -2998,7 +3045,11 @@
           <a:bodyPr/>
           <a:lstStyle/>
           <a:p>
-            <a:endParaRPr lang="en-AU"/>
+            <a:r>
+              <a:rPr lang="en-AU" dirty="0" smtClean="0"/>
+              <a:t>By Callum Edwards</a:t>
+            </a:r>
+            <a:endParaRPr lang="en-AU" dirty="0"/>
           </a:p>
         </p:txBody>
       </p:sp>
@@ -3012,6 +3063,13 @@
   <p:clrMapOvr>
     <a:masterClrMapping/>
   </p:clrMapOvr>
+  <p:timing>
+    <p:tnLst>
+      <p:par>
+        <p:cTn id="1" dur="indefinite" restart="never" nodeType="tmRoot"/>
+      </p:par>
+    </p:tnLst>
+  </p:timing>
 </p:sld>
 </file>
 

</xml_diff>

<commit_message>
Added Clothing, Food, Map and Bibliography slides
</commit_message>
<xml_diff>
--- a/callum is not asian.pptx
+++ b/callum is not asian.pptx
@@ -7,6 +7,11 @@
   <p:sldIdLst>
     <p:sldId id="256" r:id="rId2"/>
     <p:sldId id="257" r:id="rId3"/>
+    <p:sldId id="258" r:id="rId4"/>
+    <p:sldId id="259" r:id="rId5"/>
+    <p:sldId id="261" r:id="rId6"/>
+    <p:sldId id="262" r:id="rId7"/>
+    <p:sldId id="260" r:id="rId8"/>
   </p:sldIdLst>
   <p:sldSz cx="12192000" cy="6858000"/>
   <p:notesSz cx="6858000" cy="9144000"/>
@@ -244,7 +249,7 @@
           <a:p>
             <a:fld id="{745EABE3-D84A-44C6-BC81-58FB2CDECEDF}" type="datetimeFigureOut">
               <a:rPr lang="en-AU" smtClean="0"/>
-              <a:t>22/11/2017</a:t>
+              <a:t>23/11/2017</a:t>
             </a:fld>
             <a:endParaRPr lang="en-AU"/>
           </a:p>
@@ -414,7 +419,7 @@
           <a:p>
             <a:fld id="{745EABE3-D84A-44C6-BC81-58FB2CDECEDF}" type="datetimeFigureOut">
               <a:rPr lang="en-AU" smtClean="0"/>
-              <a:t>22/11/2017</a:t>
+              <a:t>23/11/2017</a:t>
             </a:fld>
             <a:endParaRPr lang="en-AU"/>
           </a:p>
@@ -594,7 +599,7 @@
           <a:p>
             <a:fld id="{745EABE3-D84A-44C6-BC81-58FB2CDECEDF}" type="datetimeFigureOut">
               <a:rPr lang="en-AU" smtClean="0"/>
-              <a:t>22/11/2017</a:t>
+              <a:t>23/11/2017</a:t>
             </a:fld>
             <a:endParaRPr lang="en-AU"/>
           </a:p>
@@ -764,7 +769,7 @@
           <a:p>
             <a:fld id="{745EABE3-D84A-44C6-BC81-58FB2CDECEDF}" type="datetimeFigureOut">
               <a:rPr lang="en-AU" smtClean="0"/>
-              <a:t>22/11/2017</a:t>
+              <a:t>23/11/2017</a:t>
             </a:fld>
             <a:endParaRPr lang="en-AU"/>
           </a:p>
@@ -1010,7 +1015,7 @@
           <a:p>
             <a:fld id="{745EABE3-D84A-44C6-BC81-58FB2CDECEDF}" type="datetimeFigureOut">
               <a:rPr lang="en-AU" smtClean="0"/>
-              <a:t>22/11/2017</a:t>
+              <a:t>23/11/2017</a:t>
             </a:fld>
             <a:endParaRPr lang="en-AU"/>
           </a:p>
@@ -1242,7 +1247,7 @@
           <a:p>
             <a:fld id="{745EABE3-D84A-44C6-BC81-58FB2CDECEDF}" type="datetimeFigureOut">
               <a:rPr lang="en-AU" smtClean="0"/>
-              <a:t>22/11/2017</a:t>
+              <a:t>23/11/2017</a:t>
             </a:fld>
             <a:endParaRPr lang="en-AU"/>
           </a:p>
@@ -1609,7 +1614,7 @@
           <a:p>
             <a:fld id="{745EABE3-D84A-44C6-BC81-58FB2CDECEDF}" type="datetimeFigureOut">
               <a:rPr lang="en-AU" smtClean="0"/>
-              <a:t>22/11/2017</a:t>
+              <a:t>23/11/2017</a:t>
             </a:fld>
             <a:endParaRPr lang="en-AU"/>
           </a:p>
@@ -1727,7 +1732,7 @@
           <a:p>
             <a:fld id="{745EABE3-D84A-44C6-BC81-58FB2CDECEDF}" type="datetimeFigureOut">
               <a:rPr lang="en-AU" smtClean="0"/>
-              <a:t>22/11/2017</a:t>
+              <a:t>23/11/2017</a:t>
             </a:fld>
             <a:endParaRPr lang="en-AU"/>
           </a:p>
@@ -1822,7 +1827,7 @@
           <a:p>
             <a:fld id="{745EABE3-D84A-44C6-BC81-58FB2CDECEDF}" type="datetimeFigureOut">
               <a:rPr lang="en-AU" smtClean="0"/>
-              <a:t>22/11/2017</a:t>
+              <a:t>23/11/2017</a:t>
             </a:fld>
             <a:endParaRPr lang="en-AU"/>
           </a:p>
@@ -2099,7 +2104,7 @@
           <a:p>
             <a:fld id="{745EABE3-D84A-44C6-BC81-58FB2CDECEDF}" type="datetimeFigureOut">
               <a:rPr lang="en-AU" smtClean="0"/>
-              <a:t>22/11/2017</a:t>
+              <a:t>23/11/2017</a:t>
             </a:fld>
             <a:endParaRPr lang="en-AU"/>
           </a:p>
@@ -2352,7 +2357,7 @@
           <a:p>
             <a:fld id="{745EABE3-D84A-44C6-BC81-58FB2CDECEDF}" type="datetimeFigureOut">
               <a:rPr lang="en-AU" smtClean="0"/>
-              <a:t>22/11/2017</a:t>
+              <a:t>23/11/2017</a:t>
             </a:fld>
             <a:endParaRPr lang="en-AU"/>
           </a:p>
@@ -2565,7 +2570,7 @@
           <a:p>
             <a:fld id="{745EABE3-D84A-44C6-BC81-58FB2CDECEDF}" type="datetimeFigureOut">
               <a:rPr lang="en-AU" smtClean="0"/>
-              <a:t>22/11/2017</a:t>
+              <a:t>23/11/2017</a:t>
             </a:fld>
             <a:endParaRPr lang="en-AU"/>
           </a:p>
@@ -3186,6 +3191,709 @@
 </p:sld>
 </file>
 
+<file path=ppt/slides/slide3.xml><?xml version="1.0" encoding="utf-8"?>
+<p:sld xmlns:a="http://schemas.openxmlformats.org/drawingml/2006/main" xmlns:r="http://schemas.openxmlformats.org/officeDocument/2006/relationships" xmlns:p="http://schemas.openxmlformats.org/presentationml/2006/main">
+  <p:cSld>
+    <p:spTree>
+      <p:nvGrpSpPr>
+        <p:cNvPr id="1" name=""/>
+        <p:cNvGrpSpPr/>
+        <p:nvPr/>
+      </p:nvGrpSpPr>
+      <p:grpSpPr>
+        <a:xfrm>
+          <a:off x="0" y="0"/>
+          <a:ext cx="0" cy="0"/>
+          <a:chOff x="0" y="0"/>
+          <a:chExt cx="0" cy="0"/>
+        </a:xfrm>
+      </p:grpSpPr>
+      <p:sp>
+        <p:nvSpPr>
+          <p:cNvPr id="2" name="Title 1"/>
+          <p:cNvSpPr>
+            <a:spLocks noGrp="1"/>
+          </p:cNvSpPr>
+          <p:nvPr>
+            <p:ph type="title"/>
+          </p:nvPr>
+        </p:nvSpPr>
+        <p:spPr/>
+        <p:txBody>
+          <a:bodyPr/>
+          <a:lstStyle/>
+          <a:p>
+            <a:r>
+              <a:rPr lang="en-AU" dirty="0" smtClean="0"/>
+              <a:t>Maps</a:t>
+            </a:r>
+            <a:endParaRPr lang="en-AU" dirty="0"/>
+          </a:p>
+        </p:txBody>
+      </p:sp>
+      <p:pic>
+        <p:nvPicPr>
+          <p:cNvPr id="4" name="Content Placeholder 3"/>
+          <p:cNvPicPr>
+            <a:picLocks noGrp="1" noChangeAspect="1"/>
+          </p:cNvPicPr>
+          <p:nvPr>
+            <p:ph idx="1"/>
+          </p:nvPr>
+        </p:nvPicPr>
+        <p:blipFill>
+          <a:blip r:embed="rId2">
+            <a:extLst>
+              <a:ext uri="{28A0092B-C50C-407E-A947-70E740481C1C}">
+                <a14:useLocalDpi xmlns:a14="http://schemas.microsoft.com/office/drawing/2010/main" val="0"/>
+              </a:ext>
+            </a:extLst>
+          </a:blip>
+          <a:stretch>
+            <a:fillRect/>
+          </a:stretch>
+        </p:blipFill>
+        <p:spPr>
+          <a:xfrm>
+            <a:off x="144708" y="1237842"/>
+            <a:ext cx="4682392" cy="5119416"/>
+          </a:xfrm>
+        </p:spPr>
+      </p:pic>
+      <p:pic>
+        <p:nvPicPr>
+          <p:cNvPr id="5" name="Picture 4"/>
+          <p:cNvPicPr>
+            <a:picLocks noChangeAspect="1"/>
+          </p:cNvPicPr>
+          <p:nvPr/>
+        </p:nvPicPr>
+        <p:blipFill>
+          <a:blip r:embed="rId3">
+            <a:extLst>
+              <a:ext uri="{28A0092B-C50C-407E-A947-70E740481C1C}">
+                <a14:useLocalDpi xmlns:a14="http://schemas.microsoft.com/office/drawing/2010/main" val="0"/>
+              </a:ext>
+            </a:extLst>
+          </a:blip>
+          <a:stretch>
+            <a:fillRect/>
+          </a:stretch>
+        </p:blipFill>
+        <p:spPr>
+          <a:xfrm>
+            <a:off x="4827100" y="1237842"/>
+            <a:ext cx="7257646" cy="5119416"/>
+          </a:xfrm>
+          <a:prstGeom prst="rect">
+            <a:avLst/>
+          </a:prstGeom>
+        </p:spPr>
+      </p:pic>
+    </p:spTree>
+    <p:extLst>
+      <p:ext uri="{BB962C8B-B14F-4D97-AF65-F5344CB8AC3E}">
+        <p14:creationId xmlns:p14="http://schemas.microsoft.com/office/powerpoint/2010/main" val="1351906172"/>
+      </p:ext>
+    </p:extLst>
+  </p:cSld>
+  <p:clrMapOvr>
+    <a:masterClrMapping/>
+  </p:clrMapOvr>
+</p:sld>
+</file>
+
+<file path=ppt/slides/slide4.xml><?xml version="1.0" encoding="utf-8"?>
+<p:sld xmlns:a="http://schemas.openxmlformats.org/drawingml/2006/main" xmlns:r="http://schemas.openxmlformats.org/officeDocument/2006/relationships" xmlns:p="http://schemas.openxmlformats.org/presentationml/2006/main">
+  <p:cSld>
+    <p:spTree>
+      <p:nvGrpSpPr>
+        <p:cNvPr id="1" name=""/>
+        <p:cNvGrpSpPr/>
+        <p:nvPr/>
+      </p:nvGrpSpPr>
+      <p:grpSpPr>
+        <a:xfrm>
+          <a:off x="0" y="0"/>
+          <a:ext cx="0" cy="0"/>
+          <a:chOff x="0" y="0"/>
+          <a:chExt cx="0" cy="0"/>
+        </a:xfrm>
+      </p:grpSpPr>
+      <p:sp>
+        <p:nvSpPr>
+          <p:cNvPr id="2" name="Title 1"/>
+          <p:cNvSpPr>
+            <a:spLocks noGrp="1"/>
+          </p:cNvSpPr>
+          <p:nvPr>
+            <p:ph type="title"/>
+          </p:nvPr>
+        </p:nvSpPr>
+        <p:spPr/>
+        <p:txBody>
+          <a:bodyPr/>
+          <a:lstStyle/>
+          <a:p>
+            <a:r>
+              <a:rPr lang="en-AU" dirty="0" smtClean="0"/>
+              <a:t>Food</a:t>
+            </a:r>
+            <a:endParaRPr lang="en-AU" dirty="0"/>
+          </a:p>
+        </p:txBody>
+      </p:sp>
+      <p:sp>
+        <p:nvSpPr>
+          <p:cNvPr id="3" name="Content Placeholder 2"/>
+          <p:cNvSpPr>
+            <a:spLocks noGrp="1"/>
+          </p:cNvSpPr>
+          <p:nvPr>
+            <p:ph idx="1"/>
+          </p:nvPr>
+        </p:nvSpPr>
+        <p:spPr/>
+        <p:txBody>
+          <a:bodyPr>
+            <a:normAutofit fontScale="92500" lnSpcReduction="10000"/>
+          </a:bodyPr>
+          <a:lstStyle/>
+          <a:p>
+            <a:r>
+              <a:rPr lang="en-AU" dirty="0" smtClean="0"/>
+              <a:t>Rice is a very important meal in Japan culture. The word for meal in Japan is </a:t>
+            </a:r>
+            <a:r>
+              <a:rPr lang="en-AU" i="1" dirty="0" err="1" smtClean="0"/>
+              <a:t>gohan</a:t>
+            </a:r>
+            <a:r>
+              <a:rPr lang="en-AU" i="1" dirty="0" smtClean="0"/>
+              <a:t> </a:t>
+            </a:r>
+            <a:r>
+              <a:rPr lang="en-AU" dirty="0" smtClean="0"/>
+              <a:t> witch refers to steamed rice, though now days the term </a:t>
+            </a:r>
+            <a:r>
+              <a:rPr lang="en-AU" i="1" dirty="0" err="1" smtClean="0"/>
+              <a:t>gohan</a:t>
+            </a:r>
+            <a:r>
+              <a:rPr lang="en-AU" dirty="0" smtClean="0"/>
+              <a:t> refers to many different types of meals. Today Japanese people eat a lot of meals from different countries and continents like Europe, North America and Asia. Japanese </a:t>
+            </a:r>
+            <a:r>
+              <a:rPr lang="en-AU" dirty="0"/>
+              <a:t>people eat bread, noodles, and pasta and enjoy a wide </a:t>
+            </a:r>
+            <a:r>
+              <a:rPr lang="en-AU" dirty="0" smtClean="0"/>
+              <a:t>variety </a:t>
+            </a:r>
+            <a:r>
+              <a:rPr lang="en-AU" dirty="0"/>
+              <a:t>of meats, fishes, vegetables, and fruits. Sushi, tempura, sukiyaki, and other </a:t>
+            </a:r>
+            <a:r>
+              <a:rPr lang="en-AU" dirty="0" smtClean="0"/>
+              <a:t>famous Japanese foods are also </a:t>
+            </a:r>
+            <a:r>
+              <a:rPr lang="en-AU" dirty="0"/>
+              <a:t>popular in Japan</a:t>
+            </a:r>
+            <a:r>
+              <a:rPr lang="en-AU" dirty="0" smtClean="0"/>
+              <a:t>.</a:t>
+            </a:r>
+            <a:r>
+              <a:rPr lang="en-AU" dirty="0"/>
+              <a:t> </a:t>
+            </a:r>
+            <a:r>
+              <a:rPr lang="en-AU" dirty="0" smtClean="0"/>
+              <a:t>Japanese have </a:t>
+            </a:r>
+            <a:r>
+              <a:rPr lang="en-AU" dirty="0"/>
+              <a:t>many fast-food restaurants </a:t>
+            </a:r>
+            <a:r>
+              <a:rPr lang="en-AU" dirty="0" smtClean="0"/>
+              <a:t>that sell </a:t>
+            </a:r>
+            <a:r>
+              <a:rPr lang="en-AU" dirty="0"/>
+              <a:t>hamburgers and fried chicken, which are especially popular with </a:t>
+            </a:r>
+            <a:r>
+              <a:rPr lang="en-AU" dirty="0" smtClean="0"/>
+              <a:t>younger </a:t>
+            </a:r>
+            <a:r>
+              <a:rPr lang="en-AU" dirty="0"/>
+              <a:t>people and </a:t>
+            </a:r>
+            <a:r>
+              <a:rPr lang="en-AU" dirty="0" smtClean="0"/>
+              <a:t>children. Before </a:t>
+            </a:r>
+            <a:r>
+              <a:rPr lang="en-AU" dirty="0"/>
+              <a:t>eating, Japanese people say "</a:t>
+            </a:r>
+            <a:r>
+              <a:rPr lang="en-AU" i="1" dirty="0" err="1"/>
+              <a:t>itadakimasu</a:t>
+            </a:r>
+            <a:r>
+              <a:rPr lang="en-AU" i="1" dirty="0"/>
+              <a:t>,</a:t>
+            </a:r>
+            <a:r>
+              <a:rPr lang="en-AU" dirty="0"/>
+              <a:t>" </a:t>
+            </a:r>
+            <a:r>
+              <a:rPr lang="en-AU" dirty="0" smtClean="0"/>
+              <a:t>which is a polite phrase that means </a:t>
+            </a:r>
+            <a:r>
+              <a:rPr lang="en-AU" dirty="0"/>
+              <a:t>"I receive this food." This expresses thanks to whoever worked to </a:t>
+            </a:r>
+            <a:r>
+              <a:rPr lang="en-AU" dirty="0" smtClean="0"/>
+              <a:t>make </a:t>
+            </a:r>
+            <a:r>
+              <a:rPr lang="en-AU" dirty="0"/>
+              <a:t>the meal. After eating, </a:t>
+            </a:r>
+            <a:r>
+              <a:rPr lang="en-AU" dirty="0" smtClean="0"/>
+              <a:t>they express </a:t>
+            </a:r>
+            <a:r>
+              <a:rPr lang="en-AU" dirty="0"/>
+              <a:t>their thanks by saying "</a:t>
+            </a:r>
+            <a:r>
+              <a:rPr lang="en-AU" i="1" dirty="0" err="1"/>
+              <a:t>gochiso</a:t>
+            </a:r>
+            <a:r>
+              <a:rPr lang="en-AU" i="1" dirty="0"/>
+              <a:t> </a:t>
+            </a:r>
+            <a:r>
+              <a:rPr lang="en-AU" i="1" dirty="0" err="1"/>
+              <a:t>sama</a:t>
+            </a:r>
+            <a:r>
+              <a:rPr lang="en-AU" i="1" dirty="0"/>
+              <a:t> </a:t>
+            </a:r>
+            <a:r>
+              <a:rPr lang="en-AU" i="1" dirty="0" err="1"/>
+              <a:t>deshita</a:t>
+            </a:r>
+            <a:r>
+              <a:rPr lang="en-AU" i="1" dirty="0"/>
+              <a:t>,</a:t>
+            </a:r>
+            <a:r>
+              <a:rPr lang="en-AU" dirty="0"/>
+              <a:t>" which literally means “It was quite a feast."</a:t>
+            </a:r>
+            <a:endParaRPr lang="en-AU" dirty="0"/>
+          </a:p>
+        </p:txBody>
+      </p:sp>
+    </p:spTree>
+    <p:extLst>
+      <p:ext uri="{BB962C8B-B14F-4D97-AF65-F5344CB8AC3E}">
+        <p14:creationId xmlns:p14="http://schemas.microsoft.com/office/powerpoint/2010/main" val="715727567"/>
+      </p:ext>
+    </p:extLst>
+  </p:cSld>
+  <p:clrMapOvr>
+    <a:masterClrMapping/>
+  </p:clrMapOvr>
+</p:sld>
+</file>
+
+<file path=ppt/slides/slide5.xml><?xml version="1.0" encoding="utf-8"?>
+<p:sld xmlns:a="http://schemas.openxmlformats.org/drawingml/2006/main" xmlns:r="http://schemas.openxmlformats.org/officeDocument/2006/relationships" xmlns:p="http://schemas.openxmlformats.org/presentationml/2006/main">
+  <p:cSld>
+    <p:spTree>
+      <p:nvGrpSpPr>
+        <p:cNvPr id="1" name=""/>
+        <p:cNvGrpSpPr/>
+        <p:nvPr/>
+      </p:nvGrpSpPr>
+      <p:grpSpPr>
+        <a:xfrm>
+          <a:off x="0" y="0"/>
+          <a:ext cx="0" cy="0"/>
+          <a:chOff x="0" y="0"/>
+          <a:chExt cx="0" cy="0"/>
+        </a:xfrm>
+      </p:grpSpPr>
+      <p:sp>
+        <p:nvSpPr>
+          <p:cNvPr id="2" name="Title 1"/>
+          <p:cNvSpPr>
+            <a:spLocks noGrp="1"/>
+          </p:cNvSpPr>
+          <p:nvPr>
+            <p:ph type="title"/>
+          </p:nvPr>
+        </p:nvSpPr>
+        <p:spPr/>
+        <p:txBody>
+          <a:bodyPr/>
+          <a:lstStyle/>
+          <a:p>
+            <a:r>
+              <a:rPr lang="en-AU" dirty="0" smtClean="0"/>
+              <a:t>Clothing</a:t>
+            </a:r>
+            <a:endParaRPr lang="en-AU" dirty="0"/>
+          </a:p>
+        </p:txBody>
+      </p:sp>
+      <p:sp>
+        <p:nvSpPr>
+          <p:cNvPr id="3" name="Content Placeholder 2"/>
+          <p:cNvSpPr>
+            <a:spLocks noGrp="1"/>
+          </p:cNvSpPr>
+          <p:nvPr>
+            <p:ph idx="1"/>
+          </p:nvPr>
+        </p:nvSpPr>
+        <p:spPr/>
+        <p:txBody>
+          <a:bodyPr>
+            <a:normAutofit lnSpcReduction="10000"/>
+          </a:bodyPr>
+          <a:lstStyle/>
+          <a:p>
+            <a:r>
+              <a:rPr lang="en-AU" dirty="0"/>
+              <a:t>The traditional </a:t>
+            </a:r>
+            <a:r>
+              <a:rPr lang="en-AU" dirty="0" smtClean="0"/>
+              <a:t>clothing </a:t>
+            </a:r>
+            <a:r>
+              <a:rPr lang="en-AU" dirty="0"/>
+              <a:t>of </a:t>
+            </a:r>
+            <a:r>
+              <a:rPr lang="en-AU" dirty="0" smtClean="0"/>
+              <a:t>Japan </a:t>
+            </a:r>
+            <a:r>
+              <a:rPr lang="en-AU" dirty="0"/>
+              <a:t>is the kimono. </a:t>
+            </a:r>
+            <a:r>
+              <a:rPr lang="en-AU" dirty="0" smtClean="0"/>
+              <a:t>Kimonos that </a:t>
+            </a:r>
+            <a:r>
+              <a:rPr lang="en-AU" dirty="0"/>
+              <a:t>are generally made of silk, have </a:t>
+            </a:r>
+            <a:r>
+              <a:rPr lang="en-AU" dirty="0" smtClean="0"/>
+              <a:t>big </a:t>
+            </a:r>
+            <a:r>
+              <a:rPr lang="en-AU" dirty="0"/>
+              <a:t>sleeves </a:t>
+            </a:r>
+            <a:r>
+              <a:rPr lang="en-AU" dirty="0" smtClean="0"/>
+              <a:t>that reach </a:t>
+            </a:r>
+            <a:r>
+              <a:rPr lang="en-AU" dirty="0"/>
+              <a:t>from the shoulders all the way down to the heels. They are </a:t>
+            </a:r>
+            <a:r>
+              <a:rPr lang="en-AU" dirty="0" smtClean="0"/>
+              <a:t>tied together </a:t>
+            </a:r>
+            <a:r>
+              <a:rPr lang="en-AU" dirty="0"/>
+              <a:t>with a wide belt </a:t>
+            </a:r>
+            <a:r>
+              <a:rPr lang="en-AU" dirty="0" smtClean="0"/>
+              <a:t>that is called </a:t>
+            </a:r>
+            <a:r>
+              <a:rPr lang="en-AU" dirty="0"/>
+              <a:t>an obi. </a:t>
+            </a:r>
+            <a:r>
+              <a:rPr lang="en-AU" dirty="0" smtClean="0"/>
+              <a:t>Now Kimonos are only really worn on special occasions such </a:t>
+            </a:r>
+            <a:r>
+              <a:rPr lang="en-AU" dirty="0"/>
+              <a:t>as the </a:t>
+            </a:r>
+            <a:r>
+              <a:rPr lang="en-AU" dirty="0" err="1"/>
+              <a:t>Shichi</a:t>
+            </a:r>
+            <a:r>
+              <a:rPr lang="en-AU" dirty="0"/>
+              <a:t>-Go-San festival, weddings, and graduation </a:t>
+            </a:r>
+            <a:r>
+              <a:rPr lang="en-AU" dirty="0" smtClean="0"/>
+              <a:t>ceremonies. Compared </a:t>
+            </a:r>
+            <a:r>
+              <a:rPr lang="en-AU" dirty="0"/>
+              <a:t>to Western </a:t>
+            </a:r>
+            <a:r>
+              <a:rPr lang="en-AU" dirty="0" smtClean="0"/>
+              <a:t>dress style, </a:t>
+            </a:r>
+            <a:r>
+              <a:rPr lang="en-AU" dirty="0"/>
+              <a:t>the kimono </a:t>
+            </a:r>
+            <a:r>
+              <a:rPr lang="en-AU" dirty="0" smtClean="0"/>
+              <a:t>limits a persons movement, </a:t>
+            </a:r>
+            <a:r>
+              <a:rPr lang="en-AU" dirty="0"/>
+              <a:t>and it takes </a:t>
+            </a:r>
+            <a:r>
+              <a:rPr lang="en-AU" dirty="0" smtClean="0"/>
+              <a:t>longer to </a:t>
+            </a:r>
+            <a:r>
+              <a:rPr lang="en-AU" dirty="0"/>
+              <a:t>put on properly. </a:t>
+            </a:r>
+            <a:r>
+              <a:rPr lang="en-AU" dirty="0" smtClean="0"/>
+              <a:t>In summer a more lightweight </a:t>
+            </a:r>
+            <a:r>
+              <a:rPr lang="en-AU" dirty="0"/>
+              <a:t>informal kimono known as a </a:t>
+            </a:r>
+            <a:r>
+              <a:rPr lang="en-AU" i="1" dirty="0"/>
+              <a:t>yukata</a:t>
+            </a:r>
+            <a:r>
+              <a:rPr lang="en-AU" dirty="0"/>
+              <a:t> is worn by children and young adults at </a:t>
+            </a:r>
+            <a:r>
+              <a:rPr lang="en-AU" dirty="0" smtClean="0"/>
+              <a:t>occasions like festivals</a:t>
+            </a:r>
+            <a:r>
+              <a:rPr lang="en-AU" dirty="0"/>
+              <a:t>, fireworks </a:t>
+            </a:r>
+            <a:r>
+              <a:rPr lang="en-AU" dirty="0" smtClean="0"/>
+              <a:t>displays </a:t>
+            </a:r>
+            <a:r>
+              <a:rPr lang="en-AU" dirty="0"/>
+              <a:t>and other special occasions. In everyday life, though, young people tend to prefer clothing that is easier to move around </a:t>
+            </a:r>
+            <a:r>
+              <a:rPr lang="en-AU" dirty="0" smtClean="0"/>
+              <a:t>in </a:t>
+            </a:r>
+            <a:r>
+              <a:rPr lang="en-AU" dirty="0"/>
+              <a:t>like </a:t>
+            </a:r>
+            <a:r>
+              <a:rPr lang="en-AU" dirty="0" smtClean="0"/>
+              <a:t>what we would wear in Australia.</a:t>
+            </a:r>
+            <a:endParaRPr lang="en-AU" dirty="0"/>
+          </a:p>
+        </p:txBody>
+      </p:sp>
+    </p:spTree>
+    <p:extLst>
+      <p:ext uri="{BB962C8B-B14F-4D97-AF65-F5344CB8AC3E}">
+        <p14:creationId xmlns:p14="http://schemas.microsoft.com/office/powerpoint/2010/main" val="1935648671"/>
+      </p:ext>
+    </p:extLst>
+  </p:cSld>
+  <p:clrMapOvr>
+    <a:masterClrMapping/>
+  </p:clrMapOvr>
+</p:sld>
+</file>
+
+<file path=ppt/slides/slide6.xml><?xml version="1.0" encoding="utf-8"?>
+<p:sld xmlns:a="http://schemas.openxmlformats.org/drawingml/2006/main" xmlns:r="http://schemas.openxmlformats.org/officeDocument/2006/relationships" xmlns:p="http://schemas.openxmlformats.org/presentationml/2006/main">
+  <p:cSld>
+    <p:spTree>
+      <p:nvGrpSpPr>
+        <p:cNvPr id="1" name=""/>
+        <p:cNvGrpSpPr/>
+        <p:nvPr/>
+      </p:nvGrpSpPr>
+      <p:grpSpPr>
+        <a:xfrm>
+          <a:off x="0" y="0"/>
+          <a:ext cx="0" cy="0"/>
+          <a:chOff x="0" y="0"/>
+          <a:chExt cx="0" cy="0"/>
+        </a:xfrm>
+      </p:grpSpPr>
+      <p:sp>
+        <p:nvSpPr>
+          <p:cNvPr id="2" name="Title 1"/>
+          <p:cNvSpPr>
+            <a:spLocks noGrp="1"/>
+          </p:cNvSpPr>
+          <p:nvPr>
+            <p:ph type="title"/>
+          </p:nvPr>
+        </p:nvSpPr>
+        <p:spPr/>
+        <p:txBody>
+          <a:bodyPr/>
+          <a:lstStyle/>
+          <a:p>
+            <a:endParaRPr lang="en-AU"/>
+          </a:p>
+        </p:txBody>
+      </p:sp>
+      <p:sp>
+        <p:nvSpPr>
+          <p:cNvPr id="3" name="Content Placeholder 2"/>
+          <p:cNvSpPr>
+            <a:spLocks noGrp="1"/>
+          </p:cNvSpPr>
+          <p:nvPr>
+            <p:ph idx="1"/>
+          </p:nvPr>
+        </p:nvSpPr>
+        <p:spPr/>
+        <p:txBody>
+          <a:bodyPr/>
+          <a:lstStyle/>
+          <a:p>
+            <a:endParaRPr lang="en-AU"/>
+          </a:p>
+        </p:txBody>
+      </p:sp>
+    </p:spTree>
+    <p:extLst>
+      <p:ext uri="{BB962C8B-B14F-4D97-AF65-F5344CB8AC3E}">
+        <p14:creationId xmlns:p14="http://schemas.microsoft.com/office/powerpoint/2010/main" val="584114236"/>
+      </p:ext>
+    </p:extLst>
+  </p:cSld>
+  <p:clrMapOvr>
+    <a:masterClrMapping/>
+  </p:clrMapOvr>
+</p:sld>
+</file>
+
+<file path=ppt/slides/slide7.xml><?xml version="1.0" encoding="utf-8"?>
+<p:sld xmlns:a="http://schemas.openxmlformats.org/drawingml/2006/main" xmlns:r="http://schemas.openxmlformats.org/officeDocument/2006/relationships" xmlns:p="http://schemas.openxmlformats.org/presentationml/2006/main">
+  <p:cSld>
+    <p:spTree>
+      <p:nvGrpSpPr>
+        <p:cNvPr id="1" name=""/>
+        <p:cNvGrpSpPr/>
+        <p:nvPr/>
+      </p:nvGrpSpPr>
+      <p:grpSpPr>
+        <a:xfrm>
+          <a:off x="0" y="0"/>
+          <a:ext cx="0" cy="0"/>
+          <a:chOff x="0" y="0"/>
+          <a:chExt cx="0" cy="0"/>
+        </a:xfrm>
+      </p:grpSpPr>
+      <p:sp>
+        <p:nvSpPr>
+          <p:cNvPr id="2" name="Title 1"/>
+          <p:cNvSpPr>
+            <a:spLocks noGrp="1"/>
+          </p:cNvSpPr>
+          <p:nvPr>
+            <p:ph type="title"/>
+          </p:nvPr>
+        </p:nvSpPr>
+        <p:spPr/>
+        <p:txBody>
+          <a:bodyPr/>
+          <a:lstStyle/>
+          <a:p>
+            <a:r>
+              <a:rPr lang="en-AU" dirty="0" smtClean="0"/>
+              <a:t>Bibliography</a:t>
+            </a:r>
+            <a:endParaRPr lang="en-AU" dirty="0"/>
+          </a:p>
+        </p:txBody>
+      </p:sp>
+      <p:sp>
+        <p:nvSpPr>
+          <p:cNvPr id="3" name="Content Placeholder 2"/>
+          <p:cNvSpPr>
+            <a:spLocks noGrp="1"/>
+          </p:cNvSpPr>
+          <p:nvPr>
+            <p:ph idx="1"/>
+          </p:nvPr>
+        </p:nvSpPr>
+        <p:spPr/>
+        <p:txBody>
+          <a:bodyPr/>
+          <a:lstStyle/>
+          <a:p>
+            <a:r>
+              <a:rPr lang="en-AU" dirty="0"/>
+              <a:t>http://web-japan.org/kidsweb/explore/housing/index.html</a:t>
+            </a:r>
+          </a:p>
+        </p:txBody>
+      </p:sp>
+    </p:spTree>
+    <p:extLst>
+      <p:ext uri="{BB962C8B-B14F-4D97-AF65-F5344CB8AC3E}">
+        <p14:creationId xmlns:p14="http://schemas.microsoft.com/office/powerpoint/2010/main" val="595982328"/>
+      </p:ext>
+    </p:extLst>
+  </p:cSld>
+  <p:clrMapOvr>
+    <a:masterClrMapping/>
+  </p:clrMapOvr>
+</p:sld>
+</file>
+
 <file path=ppt/theme/theme1.xml><?xml version="1.0" encoding="utf-8"?>
 <a:theme xmlns:a="http://schemas.openxmlformats.org/drawingml/2006/main" name="Office Theme">
   <a:themeElements>

</xml_diff>